<commit_message>
DevOps Tools - Lectyres 5
</commit_message>
<xml_diff>
--- a/Lectures/DevOpsTools/Resources/Version Control.pptx
+++ b/Lectures/DevOpsTools/Resources/Version Control.pptx
@@ -7299,7 +7299,6 @@
               <a:rPr lang="en-US" dirty="0" smtClean="0"/>
               <a:t>Centralized.</a:t>
             </a:r>
-            <a:endParaRPr lang="en-US" dirty="0" smtClean="0"/>
           </a:p>
           <a:p>
             <a:pPr marL="285750" indent="-285750">
@@ -7434,7 +7433,6 @@
               <a:rPr lang="en-US" dirty="0" smtClean="0"/>
               <a:t>Distributed</a:t>
             </a:r>
-            <a:endParaRPr lang="en-US" dirty="0" smtClean="0"/>
           </a:p>
           <a:p>
             <a:pPr marL="285750" indent="-285750">
@@ -7563,11 +7561,7 @@
             </a:pPr>
             <a:r>
               <a:rPr lang="en-US" dirty="0" smtClean="0"/>
-              <a:t>Enterprise offering. Not open-sourc</a:t>
-            </a:r>
-            <a:r>
-              <a:rPr lang="en-US" dirty="0" smtClean="0"/>
-              <a:t>e.</a:t>
+              <a:t>Enterprise offering. Not open-source.</a:t>
             </a:r>
           </a:p>
           <a:p>
@@ -7577,7 +7571,11 @@
             </a:pPr>
             <a:r>
               <a:rPr lang="en-US" dirty="0" smtClean="0"/>
-              <a:t>Ideal for large repositories with binary files</a:t>
+              <a:t>Ideal for large repositories with binary </a:t>
+            </a:r>
+            <a:r>
+              <a:rPr lang="en-US" dirty="0" smtClean="0"/>
+              <a:t>files</a:t>
             </a:r>
           </a:p>
           <a:p>
@@ -7586,14 +7584,20 @@
               <a:buChar char="•"/>
             </a:pPr>
             <a:r>
+              <a:rPr lang="en-US" smtClean="0"/>
+              <a:t>Powerful GUI tools</a:t>
+            </a:r>
+            <a:endParaRPr lang="en-US" dirty="0" smtClean="0"/>
+          </a:p>
+          <a:p>
+            <a:pPr marL="285750" indent="-285750">
+              <a:buFont typeface="Arial" panose="020B0604020202020204" pitchFamily="34" charset="0"/>
+              <a:buChar char="•"/>
+            </a:pPr>
+            <a:r>
               <a:rPr lang="en-US" dirty="0" smtClean="0"/>
-              <a:t>Suitable for </a:t>
-            </a:r>
-            <a:r>
-              <a:rPr lang="en-US" smtClean="0"/>
-              <a:t>Game development</a:t>
-            </a:r>
-            <a:endParaRPr lang="en-US" dirty="0" smtClean="0"/>
+              <a:t>Suitable for Game development</a:t>
+            </a:r>
           </a:p>
           <a:p>
             <a:pPr marL="285750" indent="-285750">

</xml_diff>